<commit_message>
Updated Phyiscs 1, project 1
</commit_message>
<xml_diff>
--- a/6019_Phys_1/D2D/W02_05/Collision_Detection (2024).pptx
+++ b/6019_Phys_1/D2D/W02_05/Collision_Detection (2024).pptx
@@ -29,6 +29,7 @@
     <p:sldId id="278" r:id="rId23"/>
     <p:sldId id="279" r:id="rId24"/>
     <p:sldId id="280" r:id="rId25"/>
+    <p:sldId id="281" r:id="rId26"/>
   </p:sldIdLst>
   <p:sldSz cx="12192000" cy="6858000"/>
   <p:notesSz cx="6858000" cy="9144000"/>
@@ -284,7 +285,7 @@
           <a:p>
             <a:fld id="{17096AE8-8B40-4419-992A-057BFACC0AD3}" type="datetimeFigureOut">
               <a:rPr lang="en-CA" smtClean="0"/>
-              <a:t>2024-10-03</a:t>
+              <a:t>2024-10-09</a:t>
             </a:fld>
             <a:endParaRPr lang="en-CA"/>
           </a:p>
@@ -484,7 +485,7 @@
           <a:p>
             <a:fld id="{17096AE8-8B40-4419-992A-057BFACC0AD3}" type="datetimeFigureOut">
               <a:rPr lang="en-CA" smtClean="0"/>
-              <a:t>2024-10-03</a:t>
+              <a:t>2024-10-09</a:t>
             </a:fld>
             <a:endParaRPr lang="en-CA"/>
           </a:p>
@@ -694,7 +695,7 @@
           <a:p>
             <a:fld id="{17096AE8-8B40-4419-992A-057BFACC0AD3}" type="datetimeFigureOut">
               <a:rPr lang="en-CA" smtClean="0"/>
-              <a:t>2024-10-03</a:t>
+              <a:t>2024-10-09</a:t>
             </a:fld>
             <a:endParaRPr lang="en-CA"/>
           </a:p>
@@ -894,7 +895,7 @@
           <a:p>
             <a:fld id="{17096AE8-8B40-4419-992A-057BFACC0AD3}" type="datetimeFigureOut">
               <a:rPr lang="en-CA" smtClean="0"/>
-              <a:t>2024-10-03</a:t>
+              <a:t>2024-10-09</a:t>
             </a:fld>
             <a:endParaRPr lang="en-CA"/>
           </a:p>
@@ -1170,7 +1171,7 @@
           <a:p>
             <a:fld id="{17096AE8-8B40-4419-992A-057BFACC0AD3}" type="datetimeFigureOut">
               <a:rPr lang="en-CA" smtClean="0"/>
-              <a:t>2024-10-03</a:t>
+              <a:t>2024-10-09</a:t>
             </a:fld>
             <a:endParaRPr lang="en-CA"/>
           </a:p>
@@ -1438,7 +1439,7 @@
           <a:p>
             <a:fld id="{17096AE8-8B40-4419-992A-057BFACC0AD3}" type="datetimeFigureOut">
               <a:rPr lang="en-CA" smtClean="0"/>
-              <a:t>2024-10-03</a:t>
+              <a:t>2024-10-09</a:t>
             </a:fld>
             <a:endParaRPr lang="en-CA"/>
           </a:p>
@@ -1853,7 +1854,7 @@
           <a:p>
             <a:fld id="{17096AE8-8B40-4419-992A-057BFACC0AD3}" type="datetimeFigureOut">
               <a:rPr lang="en-CA" smtClean="0"/>
-              <a:t>2024-10-03</a:t>
+              <a:t>2024-10-09</a:t>
             </a:fld>
             <a:endParaRPr lang="en-CA"/>
           </a:p>
@@ -1995,7 +1996,7 @@
           <a:p>
             <a:fld id="{17096AE8-8B40-4419-992A-057BFACC0AD3}" type="datetimeFigureOut">
               <a:rPr lang="en-CA" smtClean="0"/>
-              <a:t>2024-10-03</a:t>
+              <a:t>2024-10-09</a:t>
             </a:fld>
             <a:endParaRPr lang="en-CA"/>
           </a:p>
@@ -2108,7 +2109,7 @@
           <a:p>
             <a:fld id="{17096AE8-8B40-4419-992A-057BFACC0AD3}" type="datetimeFigureOut">
               <a:rPr lang="en-CA" smtClean="0"/>
-              <a:t>2024-10-03</a:t>
+              <a:t>2024-10-09</a:t>
             </a:fld>
             <a:endParaRPr lang="en-CA"/>
           </a:p>
@@ -2421,7 +2422,7 @@
           <a:p>
             <a:fld id="{17096AE8-8B40-4419-992A-057BFACC0AD3}" type="datetimeFigureOut">
               <a:rPr lang="en-CA" smtClean="0"/>
-              <a:t>2024-10-03</a:t>
+              <a:t>2024-10-09</a:t>
             </a:fld>
             <a:endParaRPr lang="en-CA"/>
           </a:p>
@@ -2710,7 +2711,7 @@
           <a:p>
             <a:fld id="{17096AE8-8B40-4419-992A-057BFACC0AD3}" type="datetimeFigureOut">
               <a:rPr lang="en-CA" smtClean="0"/>
-              <a:t>2024-10-03</a:t>
+              <a:t>2024-10-09</a:t>
             </a:fld>
             <a:endParaRPr lang="en-CA"/>
           </a:p>
@@ -2953,7 +2954,7 @@
           <a:p>
             <a:fld id="{17096AE8-8B40-4419-992A-057BFACC0AD3}" type="datetimeFigureOut">
               <a:rPr lang="en-CA" smtClean="0"/>
-              <a:t>2024-10-03</a:t>
+              <a:t>2024-10-09</a:t>
             </a:fld>
             <a:endParaRPr lang="en-CA"/>
           </a:p>
@@ -9535,7 +9536,7 @@
           </a:xfrm>
           <a:prstGeom prst="triangle">
             <a:avLst>
-              <a:gd name="adj" fmla="val 74437"/>
+              <a:gd name="adj" fmla="val 75447"/>
             </a:avLst>
           </a:prstGeom>
         </p:spPr>
@@ -9903,7 +9904,7 @@
         </p:nvSpPr>
         <p:spPr>
           <a:xfrm>
-            <a:off x="9367521" y="2877635"/>
+            <a:off x="9236710" y="2798711"/>
             <a:ext cx="274320" cy="298181"/>
           </a:xfrm>
           <a:prstGeom prst="ellipse">
@@ -9994,7 +9995,7 @@
         </p:nvSpPr>
         <p:spPr>
           <a:xfrm>
-            <a:off x="8418829" y="5227190"/>
+            <a:off x="8639810" y="5156070"/>
             <a:ext cx="274320" cy="298181"/>
           </a:xfrm>
           <a:prstGeom prst="ellipse">
@@ -10617,6 +10618,159 @@
     <p:extLst>
       <p:ext uri="{BB962C8B-B14F-4D97-AF65-F5344CB8AC3E}">
         <p14:creationId xmlns:p14="http://schemas.microsoft.com/office/powerpoint/2010/main" val="554742553"/>
+      </p:ext>
+    </p:extLst>
+  </p:cSld>
+  <p:clrMapOvr>
+    <a:masterClrMapping/>
+  </p:clrMapOvr>
+</p:sld>
+</file>
+
+<file path=ppt/slides/slide25.xml><?xml version="1.0" encoding="utf-8"?>
+<p:sld xmlns:a="http://schemas.openxmlformats.org/drawingml/2006/main" xmlns:r="http://schemas.openxmlformats.org/officeDocument/2006/relationships" xmlns:p="http://schemas.openxmlformats.org/presentationml/2006/main">
+  <p:cSld>
+    <p:spTree>
+      <p:nvGrpSpPr>
+        <p:cNvPr id="1" name=""/>
+        <p:cNvGrpSpPr/>
+        <p:nvPr/>
+      </p:nvGrpSpPr>
+      <p:grpSpPr>
+        <a:xfrm>
+          <a:off x="0" y="0"/>
+          <a:ext cx="0" cy="0"/>
+          <a:chOff x="0" y="0"/>
+          <a:chExt cx="0" cy="0"/>
+        </a:xfrm>
+      </p:grpSpPr>
+      <p:sp>
+        <p:nvSpPr>
+          <p:cNvPr id="2" name="Title 1">
+            <a:extLst>
+              <a:ext uri="{FF2B5EF4-FFF2-40B4-BE49-F238E27FC236}">
+                <a16:creationId xmlns:a16="http://schemas.microsoft.com/office/drawing/2014/main" id="{AD545A95-080A-D5C8-09CE-E7A0DA8E1452}"/>
+              </a:ext>
+            </a:extLst>
+          </p:cNvPr>
+          <p:cNvSpPr>
+            <a:spLocks noGrp="1"/>
+          </p:cNvSpPr>
+          <p:nvPr>
+            <p:ph type="title"/>
+          </p:nvPr>
+        </p:nvSpPr>
+        <p:spPr/>
+        <p:txBody>
+          <a:bodyPr/>
+          <a:lstStyle/>
+          <a:p>
+            <a:r>
+              <a:rPr lang="en-CA" dirty="0"/>
+              <a:t>Phases of collision detection</a:t>
+            </a:r>
+          </a:p>
+        </p:txBody>
+      </p:sp>
+      <p:sp>
+        <p:nvSpPr>
+          <p:cNvPr id="3" name="Content Placeholder 2">
+            <a:extLst>
+              <a:ext uri="{FF2B5EF4-FFF2-40B4-BE49-F238E27FC236}">
+                <a16:creationId xmlns:a16="http://schemas.microsoft.com/office/drawing/2014/main" id="{9F81A869-F2C3-19A7-C873-19836367C559}"/>
+              </a:ext>
+            </a:extLst>
+          </p:cNvPr>
+          <p:cNvSpPr>
+            <a:spLocks noGrp="1"/>
+          </p:cNvSpPr>
+          <p:nvPr>
+            <p:ph idx="1"/>
+          </p:nvPr>
+        </p:nvSpPr>
+        <p:spPr/>
+        <p:txBody>
+          <a:bodyPr>
+            <a:normAutofit/>
+          </a:bodyPr>
+          <a:lstStyle/>
+          <a:p>
+            <a:r>
+              <a:rPr lang="en-CA" sz="3600" dirty="0"/>
+              <a:t>Narrow phase (1</a:t>
+            </a:r>
+            <a:r>
+              <a:rPr lang="en-CA" sz="3600" baseline="30000" dirty="0"/>
+              <a:t>st</a:t>
+            </a:r>
+            <a:r>
+              <a:rPr lang="en-CA" sz="3600" dirty="0"/>
+              <a:t> ½):</a:t>
+            </a:r>
+          </a:p>
+          <a:p>
+            <a:pPr lvl="1"/>
+            <a:r>
+              <a:rPr lang="en-CA" sz="3200" dirty="0"/>
+              <a:t>Actual test: thing touches/intersects/whatever other thing</a:t>
+            </a:r>
+          </a:p>
+          <a:p>
+            <a:pPr lvl="1"/>
+            <a:r>
+              <a:rPr lang="en-CA" sz="3200" dirty="0"/>
+              <a:t>This HAS to happen</a:t>
+            </a:r>
+          </a:p>
+          <a:p>
+            <a:pPr lvl="1"/>
+            <a:r>
+              <a:rPr lang="en-CA" sz="3200" dirty="0"/>
+              <a:t>“Brute force”: testing everything with everything else</a:t>
+            </a:r>
+            <a:endParaRPr lang="en-CA" sz="2800" dirty="0"/>
+          </a:p>
+          <a:p>
+            <a:r>
+              <a:rPr lang="en-CA" sz="3600" dirty="0"/>
+              <a:t>Broad phase (2</a:t>
+            </a:r>
+            <a:r>
+              <a:rPr lang="en-CA" sz="3600" baseline="30000" dirty="0"/>
+              <a:t>nd</a:t>
+            </a:r>
+            <a:r>
+              <a:rPr lang="en-CA" sz="3600" dirty="0"/>
+              <a:t> ½ of the course):</a:t>
+            </a:r>
+          </a:p>
+          <a:p>
+            <a:pPr lvl="1"/>
+            <a:r>
+              <a:rPr lang="en-CA" sz="3200" dirty="0"/>
+              <a:t>Avoid detection unless you absolutely have to</a:t>
+            </a:r>
+          </a:p>
+          <a:p>
+            <a:pPr lvl="1"/>
+            <a:r>
+              <a:rPr lang="en-CA" sz="3200" dirty="0"/>
+              <a:t>Speeding up the detection by NOT doing detection</a:t>
+            </a:r>
+          </a:p>
+          <a:p>
+            <a:pPr lvl="1"/>
+            <a:r>
+              <a:rPr lang="en-CA" sz="3200" dirty="0"/>
+              <a:t>How “close” something is to something else</a:t>
+            </a:r>
+          </a:p>
+        </p:txBody>
+      </p:sp>
+    </p:spTree>
+    <p:extLst>
+      <p:ext uri="{BB962C8B-B14F-4D97-AF65-F5344CB8AC3E}">
+        <p14:creationId xmlns:p14="http://schemas.microsoft.com/office/powerpoint/2010/main" val="1506493635"/>
       </p:ext>
     </p:extLst>
   </p:cSld>

</xml_diff>